<commit_message>
Uploading segment 2 PowePoint Draft
</commit_message>
<xml_diff>
--- a/House Price Prediction Project.pptx
+++ b/House Price Prediction Project.pptx
@@ -47641,8 +47641,8 @@
         </p:nvSpPr>
         <p:spPr>
           <a:xfrm>
-            <a:off x="399816" y="1295305"/>
-            <a:ext cx="7317166" cy="3311116"/>
+            <a:off x="399816" y="1295304"/>
+            <a:ext cx="4513815" cy="3560713"/>
           </a:xfrm>
           <a:prstGeom prst="rect">
             <a:avLst/>
@@ -47665,42 +47665,86 @@
               <a:buChar char="▸"/>
             </a:pPr>
             <a:r>
-              <a:rPr lang="en-US" sz="1800" dirty="0"/>
-              <a:t>Well-structured testing and training CSV files from Kaggle</a:t>
+              <a:rPr lang="en-US" sz="1300" b="1" dirty="0"/>
+              <a:t>First dataset</a:t>
+            </a:r>
+            <a:r>
+              <a:rPr lang="en-US" sz="1300" dirty="0"/>
+              <a:t>: Well-structured testing and training CSV files from Kaggle (</a:t>
+            </a:r>
+            <a:r>
+              <a:rPr lang="en-US" sz="1300" dirty="0">
+                <a:hlinkClick r:id="rId3"/>
+              </a:rPr>
+              <a:t>dataset link</a:t>
+            </a:r>
+            <a:r>
+              <a:rPr lang="en-US" sz="1300" dirty="0"/>
+              <a:t>)</a:t>
             </a:r>
           </a:p>
           <a:p>
             <a:pPr lvl="1"/>
             <a:r>
-              <a:rPr lang="en-US" sz="1800" dirty="0"/>
+              <a:rPr lang="en-US" sz="1300" dirty="0"/>
               <a:t>8 columns: ‘beds’, ‘baths’, ‘size’, ‘size_units’,   ‘lot_size’, ‘lot_size_units’, ‘zip_code’,  and ‘price’</a:t>
             </a:r>
           </a:p>
           <a:p>
             <a:pPr lvl="1"/>
             <a:r>
-              <a:rPr lang="en-US" sz="1800" dirty="0"/>
+              <a:rPr lang="en-US" sz="1300" dirty="0"/>
               <a:t>Target column is ‘price’, and all other columns are the features</a:t>
             </a:r>
           </a:p>
           <a:p>
             <a:r>
-              <a:rPr lang="en-US" sz="1800" dirty="0"/>
-              <a:t>All zip codes in the United States with their coordinates</a:t>
+              <a:rPr lang="en-US" sz="1300" b="1" dirty="0"/>
+              <a:t>Second dataset</a:t>
+            </a:r>
+            <a:r>
+              <a:rPr lang="en-US" sz="1300" dirty="0"/>
+              <a:t>: All Zip Codes in the United States with their coordinates (</a:t>
+            </a:r>
+            <a:r>
+              <a:rPr lang="en-US" sz="1300" dirty="0">
+                <a:hlinkClick r:id="rId4"/>
+              </a:rPr>
+              <a:t>dataset link</a:t>
+            </a:r>
+            <a:r>
+              <a:rPr lang="en-US" sz="1300" dirty="0"/>
+              <a:t>) </a:t>
             </a:r>
           </a:p>
           <a:p>
             <a:pPr lvl="1"/>
             <a:r>
-              <a:rPr lang="en-US" sz="1800" dirty="0"/>
-              <a:t>Used VLOOKUP in Excel to extract the coordinates for Seattle</a:t>
+              <a:rPr lang="en-US" sz="1300" dirty="0"/>
+              <a:t>Used VLOOKUP in Excel to find the corresponding coordinates (‘</a:t>
+            </a:r>
+            <a:r>
+              <a:rPr lang="en-US" sz="1300" dirty="0" err="1"/>
+              <a:t>lat</a:t>
+            </a:r>
+            <a:r>
+              <a:rPr lang="en-US" sz="1300" dirty="0"/>
+              <a:t>’, ‘</a:t>
+            </a:r>
+            <a:r>
+              <a:rPr lang="en-US" sz="1300" dirty="0" err="1"/>
+              <a:t>lon</a:t>
+            </a:r>
+            <a:r>
+              <a:rPr lang="en-US" sz="1300" dirty="0"/>
+              <a:t>’) from the second dataset to the Zip Code in the first dataset (testing and training files)</a:t>
             </a:r>
           </a:p>
           <a:p>
             <a:pPr lvl="1"/>
             <a:r>
-              <a:rPr lang="en-US" sz="1800" dirty="0"/>
-              <a:t>File was then merged with the testing and training files</a:t>
+              <a:rPr lang="en-US" sz="1300" dirty="0"/>
+              <a:t>File was then merged with the testing and training files using Pandas to create the final Data Frame</a:t>
             </a:r>
           </a:p>
           <a:p>
@@ -47822,6 +47866,95 @@
           </a:p>
         </p:txBody>
       </p:sp>
+      <p:pic>
+        <p:nvPicPr>
+          <p:cNvPr id="3" name="Picture 2" descr="Table&#10;&#10;Description automatically generated">
+            <a:extLst>
+              <a:ext uri="{FF2B5EF4-FFF2-40B4-BE49-F238E27FC236}">
+                <a16:creationId xmlns:a16="http://schemas.microsoft.com/office/drawing/2014/main" id="{F40007F2-2D5F-3056-00DA-1A264552BD84}"/>
+              </a:ext>
+            </a:extLst>
+          </p:cNvPr>
+          <p:cNvPicPr>
+            <a:picLocks noChangeAspect="1"/>
+          </p:cNvPicPr>
+          <p:nvPr/>
+        </p:nvPicPr>
+        <p:blipFill rotWithShape="1">
+          <a:blip r:embed="rId5"/>
+          <a:srcRect t="1033"/>
+          <a:stretch/>
+        </p:blipFill>
+        <p:spPr>
+          <a:xfrm>
+            <a:off x="5148007" y="1212178"/>
+            <a:ext cx="1728095" cy="1815045"/>
+          </a:xfrm>
+          <a:prstGeom prst="rect">
+            <a:avLst/>
+          </a:prstGeom>
+        </p:spPr>
+      </p:pic>
+      <p:pic>
+        <p:nvPicPr>
+          <p:cNvPr id="5" name="Picture 4" descr="Table&#10;&#10;Description automatically generated">
+            <a:extLst>
+              <a:ext uri="{FF2B5EF4-FFF2-40B4-BE49-F238E27FC236}">
+                <a16:creationId xmlns:a16="http://schemas.microsoft.com/office/drawing/2014/main" id="{97EC77F7-EA57-2303-C61D-084D81FB882F}"/>
+              </a:ext>
+            </a:extLst>
+          </p:cNvPr>
+          <p:cNvPicPr>
+            <a:picLocks noChangeAspect="1"/>
+          </p:cNvPicPr>
+          <p:nvPr/>
+        </p:nvPicPr>
+        <p:blipFill>
+          <a:blip r:embed="rId6"/>
+          <a:stretch>
+            <a:fillRect/>
+          </a:stretch>
+        </p:blipFill>
+        <p:spPr>
+          <a:xfrm>
+            <a:off x="7016089" y="1226032"/>
+            <a:ext cx="1728095" cy="1733645"/>
+          </a:xfrm>
+          <a:prstGeom prst="rect">
+            <a:avLst/>
+          </a:prstGeom>
+        </p:spPr>
+      </p:pic>
+      <p:pic>
+        <p:nvPicPr>
+          <p:cNvPr id="9" name="Picture 8" descr="Table&#10;&#10;Description automatically generated">
+            <a:extLst>
+              <a:ext uri="{FF2B5EF4-FFF2-40B4-BE49-F238E27FC236}">
+                <a16:creationId xmlns:a16="http://schemas.microsoft.com/office/drawing/2014/main" id="{B3DE523A-3A91-9210-4A8D-FAD0CAA11164}"/>
+              </a:ext>
+            </a:extLst>
+          </p:cNvPr>
+          <p:cNvPicPr>
+            <a:picLocks noChangeAspect="1"/>
+          </p:cNvPicPr>
+          <p:nvPr/>
+        </p:nvPicPr>
+        <p:blipFill>
+          <a:blip r:embed="rId7"/>
+          <a:stretch>
+            <a:fillRect/>
+          </a:stretch>
+        </p:blipFill>
+        <p:spPr>
+          <a:xfrm>
+            <a:off x="5053618" y="3084030"/>
+            <a:ext cx="3879273" cy="1666875"/>
+          </a:xfrm>
+          <a:prstGeom prst="rect">
+            <a:avLst/>
+          </a:prstGeom>
+        </p:spPr>
+      </p:pic>
     </p:spTree>
   </p:cSld>
   <p:clrMapOvr>

</xml_diff>

<commit_message>
Uploading draft deliverable 2 presentation
</commit_message>
<xml_diff>
--- a/House Price Prediction Project.pptx
+++ b/House Price Prediction Project.pptx
@@ -5,7 +5,7 @@
     <p:sldMasterId id="2147483658" r:id="rId1"/>
   </p:sldMasterIdLst>
   <p:notesMasterIdLst>
-    <p:notesMasterId r:id="rId8"/>
+    <p:notesMasterId r:id="rId9"/>
   </p:notesMasterIdLst>
   <p:sldIdLst>
     <p:sldId id="256" r:id="rId2"/>
@@ -13,45 +13,46 @@
     <p:sldId id="297" r:id="rId4"/>
     <p:sldId id="269" r:id="rId5"/>
     <p:sldId id="261" r:id="rId6"/>
-    <p:sldId id="278" r:id="rId7"/>
+    <p:sldId id="298" r:id="rId7"/>
+    <p:sldId id="278" r:id="rId8"/>
   </p:sldIdLst>
   <p:sldSz cx="9144000" cy="5143500" type="screen16x9"/>
   <p:notesSz cx="6858000" cy="9144000"/>
   <p:embeddedFontLst>
     <p:embeddedFont>
       <p:font typeface="Barlow" panose="00000500000000000000" pitchFamily="2" charset="0"/>
-      <p:regular r:id="rId9"/>
-      <p:bold r:id="rId10"/>
-      <p:italic r:id="rId11"/>
-      <p:boldItalic r:id="rId12"/>
+      <p:regular r:id="rId10"/>
+      <p:bold r:id="rId11"/>
+      <p:italic r:id="rId12"/>
+      <p:boldItalic r:id="rId13"/>
     </p:embeddedFont>
     <p:embeddedFont>
       <p:font typeface="Barlow Light" panose="00000400000000000000" pitchFamily="2" charset="0"/>
-      <p:regular r:id="rId13"/>
-      <p:bold r:id="rId14"/>
-      <p:italic r:id="rId15"/>
-      <p:boldItalic r:id="rId16"/>
+      <p:regular r:id="rId14"/>
+      <p:bold r:id="rId15"/>
+      <p:italic r:id="rId16"/>
+      <p:boldItalic r:id="rId17"/>
     </p:embeddedFont>
     <p:embeddedFont>
       <p:font typeface="Calibri" panose="020F0502020204030204" pitchFamily="34" charset="0"/>
-      <p:regular r:id="rId17"/>
-      <p:bold r:id="rId18"/>
-      <p:italic r:id="rId19"/>
-      <p:boldItalic r:id="rId20"/>
+      <p:regular r:id="rId18"/>
+      <p:bold r:id="rId19"/>
+      <p:italic r:id="rId20"/>
+      <p:boldItalic r:id="rId21"/>
     </p:embeddedFont>
     <p:embeddedFont>
       <p:font typeface="playfair display" panose="00000500000000000000" pitchFamily="2" charset="0"/>
-      <p:regular r:id="rId21"/>
-      <p:bold r:id="rId22"/>
-      <p:italic r:id="rId23"/>
-      <p:boldItalic r:id="rId24"/>
+      <p:regular r:id="rId22"/>
+      <p:bold r:id="rId23"/>
+      <p:italic r:id="rId24"/>
+      <p:boldItalic r:id="rId25"/>
     </p:embeddedFont>
     <p:embeddedFont>
       <p:font typeface="Raleway Thin" pitchFamily="2" charset="0"/>
-      <p:regular r:id="rId25"/>
-      <p:bold r:id="rId26"/>
-      <p:italic r:id="rId27"/>
-      <p:boldItalic r:id="rId28"/>
+      <p:regular r:id="rId26"/>
+      <p:bold r:id="rId27"/>
+      <p:italic r:id="rId28"/>
+      <p:boldItalic r:id="rId29"/>
     </p:embeddedFont>
   </p:embeddedFontLst>
   <p:defaultTextStyle>
@@ -1258,6 +1259,75 @@
 </file>
 
 <file path=ppt/notesSlides/notesSlide6.xml><?xml version="1.0" encoding="utf-8"?>
+<p:notes xmlns:a="http://schemas.openxmlformats.org/drawingml/2006/main" xmlns:r="http://schemas.openxmlformats.org/officeDocument/2006/relationships" xmlns:p="http://schemas.openxmlformats.org/presentationml/2006/main">
+  <p:cSld>
+    <p:spTree>
+      <p:nvGrpSpPr>
+        <p:cNvPr id="1" name=""/>
+        <p:cNvGrpSpPr/>
+        <p:nvPr/>
+      </p:nvGrpSpPr>
+      <p:grpSpPr>
+        <a:xfrm>
+          <a:off x="0" y="0"/>
+          <a:ext cx="0" cy="0"/>
+          <a:chOff x="0" y="0"/>
+          <a:chExt cx="0" cy="0"/>
+        </a:xfrm>
+      </p:grpSpPr>
+      <p:sp>
+        <p:nvSpPr>
+          <p:cNvPr id="2" name="Slide Image Placeholder 1"/>
+          <p:cNvSpPr>
+            <a:spLocks noGrp="1" noRot="1" noChangeAspect="1"/>
+          </p:cNvSpPr>
+          <p:nvPr>
+            <p:ph type="sldImg"/>
+          </p:nvPr>
+        </p:nvSpPr>
+        <p:spPr>
+          <a:xfrm>
+            <a:off x="381000" y="685800"/>
+            <a:ext cx="6096000" cy="3429000"/>
+          </a:xfrm>
+        </p:spPr>
+      </p:sp>
+      <p:sp>
+        <p:nvSpPr>
+          <p:cNvPr id="3" name="Notes Placeholder 2"/>
+          <p:cNvSpPr>
+            <a:spLocks noGrp="1"/>
+          </p:cNvSpPr>
+          <p:nvPr>
+            <p:ph type="body" idx="1"/>
+          </p:nvPr>
+        </p:nvSpPr>
+        <p:spPr/>
+        <p:txBody>
+          <a:bodyPr/>
+          <a:lstStyle/>
+          <a:p>
+            <a:pPr marL="139700" indent="0">
+              <a:buNone/>
+            </a:pPr>
+            <a:endParaRPr lang="en-CA" b="1" dirty="0"/>
+          </a:p>
+        </p:txBody>
+      </p:sp>
+    </p:spTree>
+    <p:extLst>
+      <p:ext uri="{BB962C8B-B14F-4D97-AF65-F5344CB8AC3E}">
+        <p14:creationId xmlns:p14="http://schemas.microsoft.com/office/powerpoint/2010/main" val="2668549541"/>
+      </p:ext>
+    </p:extLst>
+  </p:cSld>
+  <p:clrMapOvr>
+    <a:masterClrMapping/>
+  </p:clrMapOvr>
+</p:notes>
+</file>
+
+<file path=ppt/notesSlides/notesSlide7.xml><?xml version="1.0" encoding="utf-8"?>
 <p:notes xmlns:a="http://schemas.openxmlformats.org/drawingml/2006/main" xmlns:r="http://schemas.openxmlformats.org/officeDocument/2006/relationships" xmlns:p="http://schemas.openxmlformats.org/presentationml/2006/main" showMasterSp="0" showMasterPhAnim="0">
   <p:cSld>
     <p:spTree>
@@ -47968,6 +48038,248 @@
   <p:cSld>
     <p:spTree>
       <p:nvGrpSpPr>
+        <p:cNvPr id="1" name=""/>
+        <p:cNvGrpSpPr/>
+        <p:nvPr/>
+      </p:nvGrpSpPr>
+      <p:grpSpPr>
+        <a:xfrm>
+          <a:off x="0" y="0"/>
+          <a:ext cx="0" cy="0"/>
+          <a:chOff x="0" y="0"/>
+          <a:chExt cx="0" cy="0"/>
+        </a:xfrm>
+      </p:grpSpPr>
+      <p:sp>
+        <p:nvSpPr>
+          <p:cNvPr id="2" name="Title 1">
+            <a:extLst>
+              <a:ext uri="{FF2B5EF4-FFF2-40B4-BE49-F238E27FC236}">
+                <a16:creationId xmlns:a16="http://schemas.microsoft.com/office/drawing/2014/main" id="{1B157340-62FE-85CE-715D-4A8BFFC24327}"/>
+              </a:ext>
+            </a:extLst>
+          </p:cNvPr>
+          <p:cNvSpPr>
+            <a:spLocks noGrp="1"/>
+          </p:cNvSpPr>
+          <p:nvPr>
+            <p:ph type="title"/>
+          </p:nvPr>
+        </p:nvSpPr>
+        <p:spPr>
+          <a:xfrm>
+            <a:off x="457200" y="605600"/>
+            <a:ext cx="6487706" cy="686651"/>
+          </a:xfrm>
+        </p:spPr>
+        <p:txBody>
+          <a:bodyPr/>
+          <a:lstStyle/>
+          <a:p>
+            <a:r>
+              <a:rPr lang="en-US" dirty="0"/>
+              <a:t>Tools &amp; Technologies </a:t>
+            </a:r>
+            <a:endParaRPr lang="en-CA" dirty="0"/>
+          </a:p>
+        </p:txBody>
+      </p:sp>
+      <p:sp>
+        <p:nvSpPr>
+          <p:cNvPr id="3" name="Text Placeholder 2">
+            <a:extLst>
+              <a:ext uri="{FF2B5EF4-FFF2-40B4-BE49-F238E27FC236}">
+                <a16:creationId xmlns:a16="http://schemas.microsoft.com/office/drawing/2014/main" id="{4DB6A0AE-1818-D6D8-F4EB-896FB4D9E046}"/>
+              </a:ext>
+            </a:extLst>
+          </p:cNvPr>
+          <p:cNvSpPr>
+            <a:spLocks noGrp="1"/>
+          </p:cNvSpPr>
+          <p:nvPr>
+            <p:ph type="body" idx="1"/>
+          </p:nvPr>
+        </p:nvSpPr>
+        <p:spPr>
+          <a:xfrm>
+            <a:off x="457200" y="1401435"/>
+            <a:ext cx="6117412" cy="2640900"/>
+          </a:xfrm>
+        </p:spPr>
+        <p:txBody>
+          <a:bodyPr/>
+          <a:lstStyle/>
+          <a:p>
+            <a:r>
+              <a:rPr lang="en-US" dirty="0"/>
+              <a:t>Visualization: Tableau, Seaborn, Matplotlib</a:t>
+            </a:r>
+          </a:p>
+          <a:p>
+            <a:r>
+              <a:rPr lang="en-US" dirty="0"/>
+              <a:t>Data Analysis: Jupyter Notebook, Excel</a:t>
+            </a:r>
+          </a:p>
+          <a:p>
+            <a:r>
+              <a:rPr lang="en-US" dirty="0"/>
+              <a:t>Algorithms: Linear Regression, Random Forest Regression, k-Nearest Neighbours (k-NN)</a:t>
+            </a:r>
+          </a:p>
+          <a:p>
+            <a:endParaRPr lang="en-US" dirty="0"/>
+          </a:p>
+          <a:p>
+            <a:endParaRPr lang="en-CA" dirty="0"/>
+          </a:p>
+        </p:txBody>
+      </p:sp>
+      <p:sp>
+        <p:nvSpPr>
+          <p:cNvPr id="4" name="Slide Number Placeholder 3">
+            <a:extLst>
+              <a:ext uri="{FF2B5EF4-FFF2-40B4-BE49-F238E27FC236}">
+                <a16:creationId xmlns:a16="http://schemas.microsoft.com/office/drawing/2014/main" id="{4D0EC28B-476D-2710-774B-D50906A5BF18}"/>
+              </a:ext>
+            </a:extLst>
+          </p:cNvPr>
+          <p:cNvSpPr>
+            <a:spLocks noGrp="1"/>
+          </p:cNvSpPr>
+          <p:nvPr>
+            <p:ph type="sldNum" idx="12"/>
+          </p:nvPr>
+        </p:nvSpPr>
+        <p:spPr/>
+        <p:txBody>
+          <a:bodyPr/>
+          <a:lstStyle/>
+          <a:p>
+            <a:pPr marL="0" lvl="0" indent="0" algn="r" rtl="0">
+              <a:spcBef>
+                <a:spcPts val="0"/>
+              </a:spcBef>
+              <a:spcAft>
+                <a:spcPts val="0"/>
+              </a:spcAft>
+              <a:buNone/>
+            </a:pPr>
+            <a:fld id="{00000000-1234-1234-1234-123412341234}" type="slidenum">
+              <a:rPr lang="en" smtClean="0"/>
+              <a:t>6</a:t>
+            </a:fld>
+            <a:endParaRPr lang="en"/>
+          </a:p>
+        </p:txBody>
+      </p:sp>
+      <p:grpSp>
+        <p:nvGrpSpPr>
+          <p:cNvPr id="5" name="Google Shape;119;p17">
+            <a:extLst>
+              <a:ext uri="{FF2B5EF4-FFF2-40B4-BE49-F238E27FC236}">
+                <a16:creationId xmlns:a16="http://schemas.microsoft.com/office/drawing/2014/main" id="{78D17066-73B6-35E1-A21B-DB6C6CD13EAB}"/>
+              </a:ext>
+            </a:extLst>
+          </p:cNvPr>
+          <p:cNvGrpSpPr/>
+          <p:nvPr/>
+        </p:nvGrpSpPr>
+        <p:grpSpPr>
+          <a:xfrm>
+            <a:off x="5971952" y="1217509"/>
+            <a:ext cx="2714848" cy="3653541"/>
+            <a:chOff x="5503615" y="983605"/>
+            <a:chExt cx="3588221" cy="4828894"/>
+          </a:xfrm>
+        </p:grpSpPr>
+        <p:pic>
+          <p:nvPicPr>
+            <p:cNvPr id="6" name="Google Shape;120;p17">
+              <a:extLst>
+                <a:ext uri="{FF2B5EF4-FFF2-40B4-BE49-F238E27FC236}">
+                  <a16:creationId xmlns:a16="http://schemas.microsoft.com/office/drawing/2014/main" id="{B6CC723C-1F87-2541-6BBA-2308827FC081}"/>
+                </a:ext>
+              </a:extLst>
+            </p:cNvPr>
+            <p:cNvPicPr preferRelativeResize="0"/>
+            <p:nvPr/>
+          </p:nvPicPr>
+          <p:blipFill>
+            <a:blip r:embed="rId3">
+              <a:alphaModFix/>
+            </a:blip>
+            <a:stretch>
+              <a:fillRect/>
+            </a:stretch>
+          </p:blipFill>
+          <p:spPr>
+            <a:xfrm>
+              <a:off x="5503615" y="983605"/>
+              <a:ext cx="3588221" cy="4828894"/>
+            </a:xfrm>
+            <a:prstGeom prst="rect">
+              <a:avLst/>
+            </a:prstGeom>
+            <a:noFill/>
+            <a:ln>
+              <a:noFill/>
+            </a:ln>
+          </p:spPr>
+        </p:pic>
+        <p:pic>
+          <p:nvPicPr>
+            <p:cNvPr id="7" name="Google Shape;121;p17">
+              <a:extLst>
+                <a:ext uri="{FF2B5EF4-FFF2-40B4-BE49-F238E27FC236}">
+                  <a16:creationId xmlns:a16="http://schemas.microsoft.com/office/drawing/2014/main" id="{438DD6C6-5286-88CB-013D-25AE59618969}"/>
+                </a:ext>
+              </a:extLst>
+            </p:cNvPr>
+            <p:cNvPicPr preferRelativeResize="0"/>
+            <p:nvPr/>
+          </p:nvPicPr>
+          <p:blipFill>
+            <a:blip r:embed="rId4">
+              <a:alphaModFix/>
+            </a:blip>
+            <a:stretch>
+              <a:fillRect/>
+            </a:stretch>
+          </p:blipFill>
+          <p:spPr>
+            <a:xfrm>
+              <a:off x="7109435" y="1724361"/>
+              <a:ext cx="322950" cy="316620"/>
+            </a:xfrm>
+            <a:prstGeom prst="rect">
+              <a:avLst/>
+            </a:prstGeom>
+            <a:noFill/>
+            <a:ln>
+              <a:noFill/>
+            </a:ln>
+          </p:spPr>
+        </p:pic>
+      </p:grpSp>
+    </p:spTree>
+    <p:extLst>
+      <p:ext uri="{BB962C8B-B14F-4D97-AF65-F5344CB8AC3E}">
+        <p14:creationId xmlns:p14="http://schemas.microsoft.com/office/powerpoint/2010/main" val="1532952839"/>
+      </p:ext>
+    </p:extLst>
+  </p:cSld>
+  <p:clrMapOvr>
+    <a:masterClrMapping/>
+  </p:clrMapOvr>
+</p:sld>
+</file>
+
+<file path=ppt/slides/slide7.xml><?xml version="1.0" encoding="utf-8"?>
+<p:sld xmlns:a="http://schemas.openxmlformats.org/drawingml/2006/main" xmlns:r="http://schemas.openxmlformats.org/officeDocument/2006/relationships" xmlns:p="http://schemas.openxmlformats.org/presentationml/2006/main">
+  <p:cSld>
+    <p:spTree>
+      <p:nvGrpSpPr>
         <p:cNvPr id="1" name="Shape 2075"/>
         <p:cNvGrpSpPr/>
         <p:nvPr/>
@@ -48016,7 +48328,7 @@
             </a:pPr>
             <a:fld id="{00000000-1234-1234-1234-123412341234}" type="slidenum">
               <a:rPr lang="en"/>
-              <a:t>6</a:t>
+              <a:t>7</a:t>
             </a:fld>
             <a:endParaRPr/>
           </a:p>

</xml_diff>